<commit_message>
Changes introduction presentation to fix a typo about Brennan and Resnick CT
</commit_message>
<xml_diff>
--- a/day1/introduction/introduction_presentation.pptx
+++ b/day1/introduction/introduction_presentation.pptx
@@ -5,7 +5,7 @@
     <p:sldMasterId id="2147483738" r:id="rId1"/>
   </p:sldMasterIdLst>
   <p:notesMasterIdLst>
-    <p:notesMasterId r:id="rId30"/>
+    <p:notesMasterId r:id="rId29"/>
   </p:notesMasterIdLst>
   <p:sldIdLst>
     <p:sldId id="256" r:id="rId2"/>
@@ -24,18 +24,17 @@
     <p:sldId id="278" r:id="rId15"/>
     <p:sldId id="263" r:id="rId16"/>
     <p:sldId id="279" r:id="rId17"/>
-    <p:sldId id="280" r:id="rId18"/>
-    <p:sldId id="281" r:id="rId19"/>
-    <p:sldId id="283" r:id="rId20"/>
-    <p:sldId id="282" r:id="rId21"/>
-    <p:sldId id="284" r:id="rId22"/>
-    <p:sldId id="287" r:id="rId23"/>
-    <p:sldId id="288" r:id="rId24"/>
-    <p:sldId id="285" r:id="rId25"/>
-    <p:sldId id="286" r:id="rId26"/>
-    <p:sldId id="264" r:id="rId27"/>
-    <p:sldId id="266" r:id="rId28"/>
-    <p:sldId id="269" r:id="rId29"/>
+    <p:sldId id="281" r:id="rId18"/>
+    <p:sldId id="283" r:id="rId19"/>
+    <p:sldId id="282" r:id="rId20"/>
+    <p:sldId id="284" r:id="rId21"/>
+    <p:sldId id="287" r:id="rId22"/>
+    <p:sldId id="288" r:id="rId23"/>
+    <p:sldId id="285" r:id="rId24"/>
+    <p:sldId id="286" r:id="rId25"/>
+    <p:sldId id="264" r:id="rId26"/>
+    <p:sldId id="266" r:id="rId27"/>
+    <p:sldId id="269" r:id="rId28"/>
   </p:sldIdLst>
   <p:sldSz cx="12192000" cy="6858000"/>
   <p:notesSz cx="6858000" cy="9144000"/>
@@ -224,7 +223,7 @@
           <a:p>
             <a:fld id="{69275D5D-7688-4913-8B6B-4D19187E922C}" type="datetimeFigureOut">
               <a:rPr lang="en-AU" smtClean="0"/>
-              <a:t>7/10/19</a:t>
+              <a:t>9/10/19</a:t>
             </a:fld>
             <a:endParaRPr lang="en-AU"/>
           </a:p>
@@ -1152,7 +1151,7 @@
           <a:p>
             <a:fld id="{AD397E88-8B8C-4FE4-8698-DAE17625806D}" type="datetime1">
               <a:rPr lang="en-AU" smtClean="0"/>
-              <a:t>7/10/19</a:t>
+              <a:t>9/10/19</a:t>
             </a:fld>
             <a:endParaRPr lang="en-AU"/>
           </a:p>
@@ -1354,7 +1353,7 @@
           <a:p>
             <a:fld id="{02C013F8-F204-402A-A620-4FFCC75140E6}" type="datetime1">
               <a:rPr lang="en-AU" smtClean="0"/>
-              <a:t>7/10/19</a:t>
+              <a:t>9/10/19</a:t>
             </a:fld>
             <a:endParaRPr lang="en-AU"/>
           </a:p>
@@ -1534,7 +1533,7 @@
           <a:p>
             <a:fld id="{12AFAAA8-0535-4875-84F1-0C175CD704A5}" type="datetime1">
               <a:rPr lang="en-AU" smtClean="0"/>
-              <a:t>7/10/19</a:t>
+              <a:t>9/10/19</a:t>
             </a:fld>
             <a:endParaRPr lang="en-AU"/>
           </a:p>
@@ -1704,7 +1703,7 @@
           <a:p>
             <a:fld id="{F6F408D4-586B-465B-AE20-82098464DF06}" type="datetime1">
               <a:rPr lang="en-AU" smtClean="0"/>
-              <a:t>7/10/19</a:t>
+              <a:t>9/10/19</a:t>
             </a:fld>
             <a:endParaRPr lang="en-AU"/>
           </a:p>
@@ -2275,7 +2274,7 @@
           <a:p>
             <a:fld id="{31595267-A888-4B59-88C3-DCE3ADDACF93}" type="datetime1">
               <a:rPr lang="en-AU" smtClean="0"/>
-              <a:t>7/10/19</a:t>
+              <a:t>9/10/19</a:t>
             </a:fld>
             <a:endParaRPr lang="en-AU"/>
           </a:p>
@@ -2577,7 +2576,7 @@
           <a:p>
             <a:fld id="{2AC3795C-5A1D-4A77-B19A-33089EC4C1FF}" type="datetime1">
               <a:rPr lang="en-AU" smtClean="0"/>
-              <a:t>7/10/19</a:t>
+              <a:t>9/10/19</a:t>
             </a:fld>
             <a:endParaRPr lang="en-AU"/>
           </a:p>
@@ -3014,7 +3013,7 @@
           <a:p>
             <a:fld id="{95AAE89E-E22D-403B-86F9-61E7C8C429E9}" type="datetime1">
               <a:rPr lang="en-AU" smtClean="0"/>
-              <a:t>7/10/19</a:t>
+              <a:t>9/10/19</a:t>
             </a:fld>
             <a:endParaRPr lang="en-AU"/>
           </a:p>
@@ -3132,7 +3131,7 @@
           <a:p>
             <a:fld id="{1E92241C-85A3-4D71-85F3-CE15931DC7FC}" type="datetime1">
               <a:rPr lang="en-AU" smtClean="0"/>
-              <a:t>7/10/19</a:t>
+              <a:t>9/10/19</a:t>
             </a:fld>
             <a:endParaRPr lang="en-AU"/>
           </a:p>
@@ -3227,7 +3226,7 @@
           <a:p>
             <a:fld id="{9DA2C96B-ADAC-454F-A85E-A4F5A031F2D2}" type="datetime1">
               <a:rPr lang="en-AU" smtClean="0"/>
-              <a:t>7/10/19</a:t>
+              <a:t>9/10/19</a:t>
             </a:fld>
             <a:endParaRPr lang="en-AU"/>
           </a:p>
@@ -3609,7 +3608,7 @@
           <a:p>
             <a:fld id="{8407A1EE-2337-4686-8DAB-53D57DB00D3D}" type="datetime1">
               <a:rPr lang="en-AU" smtClean="0"/>
-              <a:t>7/10/19</a:t>
+              <a:t>9/10/19</a:t>
             </a:fld>
             <a:endParaRPr lang="en-AU"/>
           </a:p>
@@ -4003,7 +4002,7 @@
           <a:p>
             <a:fld id="{C4B48510-C563-45B7-A866-5F97314A120E}" type="datetime1">
               <a:rPr lang="en-AU" smtClean="0"/>
-              <a:t>7/10/19</a:t>
+              <a:t>9/10/19</a:t>
             </a:fld>
             <a:endParaRPr lang="en-AU"/>
           </a:p>
@@ -4316,7 +4315,7 @@
           <a:p>
             <a:fld id="{13D3F349-7A96-4C49-AEE3-B3022BD0C97F}" type="datetime1">
               <a:rPr lang="en-AU" smtClean="0"/>
-              <a:t>7/10/19</a:t>
+              <a:t>9/10/19</a:t>
             </a:fld>
             <a:endParaRPr lang="en-AU"/>
           </a:p>
@@ -6930,7 +6929,7 @@
           <a:p>
             <a:r>
               <a:rPr lang="en-AU" sz="2400" dirty="0"/>
-              <a:t>According Brennan and Resnick</a:t>
+              <a:t>According to Brennan and Resnick</a:t>
             </a:r>
             <a:r>
               <a:rPr lang="en-AU" sz="2400" baseline="30000" dirty="0"/>
@@ -6938,7 +6937,7 @@
             </a:r>
             <a:r>
               <a:rPr lang="en-AU" sz="2400" dirty="0"/>
-              <a:t> – the creators of Scratch – there are  3 key dimensions of computational thinking : </a:t>
+              <a:t> – the creators of Scratch – there are 3 key dimensions of computational thinking : </a:t>
             </a:r>
           </a:p>
           <a:p>
@@ -7070,7 +7069,7 @@
           <a:p>
             <a:r>
               <a:rPr lang="en-AU" dirty="0"/>
-              <a:t>Computational Thinking</a:t>
+              <a:t>Computational Concepts</a:t>
             </a:r>
           </a:p>
         </p:txBody>
@@ -7093,27 +7092,33 @@
           <a:lstStyle/>
           <a:p>
             <a:r>
+              <a:rPr lang="en-AU" sz="2400" b="1" dirty="0"/>
+              <a:t>Sequences</a:t>
+            </a:r>
+            <a:r>
               <a:rPr lang="en-AU" sz="2400" dirty="0"/>
-              <a:t>According Brennan and Resnick</a:t>
-            </a:r>
-            <a:r>
-              <a:rPr lang="en-AU" sz="2400" baseline="30000" dirty="0"/>
-              <a:t>7</a:t>
-            </a:r>
+              <a:t> </a:t>
+            </a:r>
+          </a:p>
+          <a:p>
+            <a:endParaRPr lang="en-AU" sz="2400" dirty="0"/>
+          </a:p>
+          <a:p>
+            <a:pPr marL="0" indent="0" algn="ctr">
+              <a:buNone/>
+            </a:pPr>
             <a:r>
               <a:rPr lang="en-AU" sz="2400" dirty="0"/>
-              <a:t> – the creators of Scratch – there are  3 key dimensions of computational thinking : </a:t>
-            </a:r>
-          </a:p>
-          <a:p>
-            <a:pPr lvl="1"/>
+              <a:t>“a particular activity or task is expressed as a series of individual steps or instructions that can be executed by the computer. Like a recipe, a sequence of programming instructions specifies the </a:t>
+            </a:r>
+            <a:r>
+              <a:rPr lang="en-AU" sz="2400" dirty="0" err="1"/>
+              <a:t>behavior</a:t>
+            </a:r>
             <a:r>
               <a:rPr lang="en-AU" sz="2400" dirty="0"/>
-              <a:t>computational concepts (such as loops, parallelism, etc.), </a:t>
-            </a:r>
-          </a:p>
-          <a:p>
-            <a:endParaRPr lang="en-AU" sz="2400" dirty="0"/>
+              <a:t> or action that should be produced”</a:t>
+            </a:r>
           </a:p>
         </p:txBody>
       </p:sp>
@@ -7135,162 +7140,6 @@
             <a:fld id="{9DA84D9E-BF3A-4773-AB62-CF0D9AB694A3}" type="slidenum">
               <a:rPr lang="en-AU" smtClean="0"/>
               <a:t>17</a:t>
-            </a:fld>
-            <a:endParaRPr lang="en-AU"/>
-          </a:p>
-        </p:txBody>
-      </p:sp>
-      <p:pic>
-        <p:nvPicPr>
-          <p:cNvPr id="6" name="Picture 5" descr="http://www.newcastle.edu.au/__data/assets/image/0004/184306/Updated-web-banner-02.png"/>
-          <p:cNvPicPr/>
-          <p:nvPr/>
-        </p:nvPicPr>
-        <p:blipFill>
-          <a:blip r:embed="rId2">
-            <a:extLst>
-              <a:ext uri="{28A0092B-C50C-407E-A947-70E740481C1C}">
-                <a14:useLocalDpi xmlns:a14="http://schemas.microsoft.com/office/drawing/2010/main" val="0"/>
-              </a:ext>
-            </a:extLst>
-          </a:blip>
-          <a:srcRect/>
-          <a:stretch>
-            <a:fillRect/>
-          </a:stretch>
-        </p:blipFill>
-        <p:spPr bwMode="auto">
-          <a:xfrm>
-            <a:off x="292553" y="6123966"/>
-            <a:ext cx="4248150" cy="549910"/>
-          </a:xfrm>
-          <a:prstGeom prst="rect">
-            <a:avLst/>
-          </a:prstGeom>
-          <a:noFill/>
-          <a:ln>
-            <a:noFill/>
-          </a:ln>
-        </p:spPr>
-      </p:pic>
-    </p:spTree>
-    <p:extLst>
-      <p:ext uri="{BB962C8B-B14F-4D97-AF65-F5344CB8AC3E}">
-        <p14:creationId xmlns:p14="http://schemas.microsoft.com/office/powerpoint/2010/main" val="2909359824"/>
-      </p:ext>
-    </p:extLst>
-  </p:cSld>
-  <p:clrMapOvr>
-    <a:masterClrMapping/>
-  </p:clrMapOvr>
-</p:sld>
-</file>
-
-<file path=ppt/slides/slide18.xml><?xml version="1.0" encoding="utf-8"?>
-<p:sld xmlns:a="http://schemas.openxmlformats.org/drawingml/2006/main" xmlns:r="http://schemas.openxmlformats.org/officeDocument/2006/relationships" xmlns:p="http://schemas.openxmlformats.org/presentationml/2006/main">
-  <p:cSld>
-    <p:spTree>
-      <p:nvGrpSpPr>
-        <p:cNvPr id="1" name=""/>
-        <p:cNvGrpSpPr/>
-        <p:nvPr/>
-      </p:nvGrpSpPr>
-      <p:grpSpPr>
-        <a:xfrm>
-          <a:off x="0" y="0"/>
-          <a:ext cx="0" cy="0"/>
-          <a:chOff x="0" y="0"/>
-          <a:chExt cx="0" cy="0"/>
-        </a:xfrm>
-      </p:grpSpPr>
-      <p:sp>
-        <p:nvSpPr>
-          <p:cNvPr id="2" name="Title 1"/>
-          <p:cNvSpPr>
-            <a:spLocks noGrp="1"/>
-          </p:cNvSpPr>
-          <p:nvPr>
-            <p:ph type="title"/>
-          </p:nvPr>
-        </p:nvSpPr>
-        <p:spPr/>
-        <p:txBody>
-          <a:bodyPr/>
-          <a:lstStyle/>
-          <a:p>
-            <a:r>
-              <a:rPr lang="en-AU" dirty="0"/>
-              <a:t>Computational Concepts</a:t>
-            </a:r>
-          </a:p>
-        </p:txBody>
-      </p:sp>
-      <p:sp>
-        <p:nvSpPr>
-          <p:cNvPr id="3" name="Content Placeholder 2"/>
-          <p:cNvSpPr>
-            <a:spLocks noGrp="1"/>
-          </p:cNvSpPr>
-          <p:nvPr>
-            <p:ph idx="1"/>
-          </p:nvPr>
-        </p:nvSpPr>
-        <p:spPr/>
-        <p:txBody>
-          <a:bodyPr>
-            <a:noAutofit/>
-          </a:bodyPr>
-          <a:lstStyle/>
-          <a:p>
-            <a:r>
-              <a:rPr lang="en-AU" sz="2400" b="1" dirty="0"/>
-              <a:t>Sequences</a:t>
-            </a:r>
-            <a:r>
-              <a:rPr lang="en-AU" sz="2400" dirty="0"/>
-              <a:t> </a:t>
-            </a:r>
-          </a:p>
-          <a:p>
-            <a:endParaRPr lang="en-AU" sz="2400" dirty="0"/>
-          </a:p>
-          <a:p>
-            <a:pPr marL="0" indent="0" algn="ctr">
-              <a:buNone/>
-            </a:pPr>
-            <a:r>
-              <a:rPr lang="en-AU" sz="2400" dirty="0"/>
-              <a:t>“a particular activity or task is expressed as a series of individual steps or instructions that can be executed by the computer. Like a recipe, a sequence of programming instructions specifies the </a:t>
-            </a:r>
-            <a:r>
-              <a:rPr lang="en-AU" sz="2400" dirty="0" err="1"/>
-              <a:t>behavior</a:t>
-            </a:r>
-            <a:r>
-              <a:rPr lang="en-AU" sz="2400" dirty="0"/>
-              <a:t> or action that should be produced”</a:t>
-            </a:r>
-          </a:p>
-        </p:txBody>
-      </p:sp>
-      <p:sp>
-        <p:nvSpPr>
-          <p:cNvPr id="5" name="Slide Number Placeholder 4"/>
-          <p:cNvSpPr>
-            <a:spLocks noGrp="1"/>
-          </p:cNvSpPr>
-          <p:nvPr>
-            <p:ph type="sldNum" sz="quarter" idx="12"/>
-          </p:nvPr>
-        </p:nvSpPr>
-        <p:spPr/>
-        <p:txBody>
-          <a:bodyPr/>
-          <a:lstStyle/>
-          <a:p>
-            <a:fld id="{9DA84D9E-BF3A-4773-AB62-CF0D9AB694A3}" type="slidenum">
-              <a:rPr lang="en-AU" smtClean="0"/>
-              <a:t>18</a:t>
             </a:fld>
             <a:endParaRPr lang="en-AU"/>
           </a:p>
@@ -7342,7 +7191,7 @@
 </p:sld>
 </file>
 
-<file path=ppt/slides/slide19.xml><?xml version="1.0" encoding="utf-8"?>
+<file path=ppt/slides/slide18.xml><?xml version="1.0" encoding="utf-8"?>
 <p:sld xmlns:a="http://schemas.openxmlformats.org/drawingml/2006/main" xmlns:r="http://schemas.openxmlformats.org/officeDocument/2006/relationships" xmlns:p="http://schemas.openxmlformats.org/presentationml/2006/main">
   <p:cSld>
     <p:spTree>
@@ -7429,7 +7278,7 @@
           <a:p>
             <a:fld id="{9DA84D9E-BF3A-4773-AB62-CF0D9AB694A3}" type="slidenum">
               <a:rPr lang="en-AU" smtClean="0"/>
-              <a:t>19</a:t>
+              <a:t>18</a:t>
             </a:fld>
             <a:endParaRPr lang="en-AU"/>
           </a:p>
@@ -7505,7 +7354,7 @@
 </p:sld>
 </file>
 
-<file path=ppt/slides/slide2.xml><?xml version="1.0" encoding="utf-8"?>
+<file path=ppt/slides/slide19.xml><?xml version="1.0" encoding="utf-8"?>
 <p:sld xmlns:a="http://schemas.openxmlformats.org/drawingml/2006/main" xmlns:r="http://schemas.openxmlformats.org/officeDocument/2006/relationships" xmlns:p="http://schemas.openxmlformats.org/presentationml/2006/main">
   <p:cSld>
     <p:spTree>
@@ -7538,135 +7387,6 @@
           <a:lstStyle/>
           <a:p>
             <a:r>
-              <a:rPr lang="en-US" dirty="0">
-                <a:solidFill>
-                  <a:schemeClr val="tx1"/>
-                </a:solidFill>
-              </a:rPr>
-              <a:t>This land</a:t>
-            </a:r>
-          </a:p>
-        </p:txBody>
-      </p:sp>
-      <p:pic>
-        <p:nvPicPr>
-          <p:cNvPr id="4" name="Content Placeholder 3" descr="map-extract.png"/>
-          <p:cNvPicPr>
-            <a:picLocks noGrp="1" noChangeAspect="1"/>
-          </p:cNvPicPr>
-          <p:nvPr>
-            <p:ph idx="1"/>
-          </p:nvPr>
-        </p:nvPicPr>
-        <p:blipFill rotWithShape="1">
-          <a:blip r:embed="rId3">
-            <a:extLst>
-              <a:ext uri="{28A0092B-C50C-407E-A947-70E740481C1C}">
-                <a14:useLocalDpi xmlns:a14="http://schemas.microsoft.com/office/drawing/2010/main" val="0"/>
-              </a:ext>
-            </a:extLst>
-          </a:blip>
-          <a:stretch/>
-        </p:blipFill>
-        <p:spPr>
-          <a:xfrm>
-            <a:off x="4607655" y="4004004"/>
-            <a:ext cx="2976689" cy="2154183"/>
-          </a:xfrm>
-        </p:spPr>
-      </p:pic>
-      <p:sp>
-        <p:nvSpPr>
-          <p:cNvPr id="5" name="TextBox 4"/>
-          <p:cNvSpPr txBox="1"/>
-          <p:nvPr/>
-        </p:nvSpPr>
-        <p:spPr>
-          <a:xfrm>
-            <a:off x="1442783" y="2156067"/>
-            <a:ext cx="10072183" cy="1569660"/>
-          </a:xfrm>
-          <a:prstGeom prst="rect">
-            <a:avLst/>
-          </a:prstGeom>
-          <a:noFill/>
-        </p:spPr>
-        <p:txBody>
-          <a:bodyPr wrap="square" rtlCol="0">
-            <a:spAutoFit/>
-          </a:bodyPr>
-          <a:lstStyle/>
-          <a:p>
-            <a:pPr algn="ctr"/>
-            <a:r>
-              <a:rPr lang="en-US" sz="3200" dirty="0"/>
-              <a:t>We acknowledge and respect the </a:t>
-            </a:r>
-            <a:r>
-              <a:rPr lang="en-US" sz="3200" dirty="0" err="1"/>
-              <a:t>Pambalong</a:t>
-            </a:r>
-            <a:r>
-              <a:rPr lang="en-US" sz="3200" dirty="0"/>
-              <a:t> clan of the </a:t>
-            </a:r>
-            <a:r>
-              <a:rPr lang="en-US" sz="3200" dirty="0" err="1"/>
-              <a:t>Awabakal</a:t>
-            </a:r>
-            <a:r>
-              <a:rPr lang="en-US" sz="3200" dirty="0"/>
-              <a:t> people, traditional custodians of this land.</a:t>
-            </a:r>
-          </a:p>
-        </p:txBody>
-      </p:sp>
-    </p:spTree>
-    <p:extLst>
-      <p:ext uri="{BB962C8B-B14F-4D97-AF65-F5344CB8AC3E}">
-        <p14:creationId xmlns:p14="http://schemas.microsoft.com/office/powerpoint/2010/main" val="2442160859"/>
-      </p:ext>
-    </p:extLst>
-  </p:cSld>
-  <p:clrMapOvr>
-    <a:masterClrMapping/>
-  </p:clrMapOvr>
-</p:sld>
-</file>
-
-<file path=ppt/slides/slide20.xml><?xml version="1.0" encoding="utf-8"?>
-<p:sld xmlns:a="http://schemas.openxmlformats.org/drawingml/2006/main" xmlns:r="http://schemas.openxmlformats.org/officeDocument/2006/relationships" xmlns:p="http://schemas.openxmlformats.org/presentationml/2006/main">
-  <p:cSld>
-    <p:spTree>
-      <p:nvGrpSpPr>
-        <p:cNvPr id="1" name=""/>
-        <p:cNvGrpSpPr/>
-        <p:nvPr/>
-      </p:nvGrpSpPr>
-      <p:grpSpPr>
-        <a:xfrm>
-          <a:off x="0" y="0"/>
-          <a:ext cx="0" cy="0"/>
-          <a:chOff x="0" y="0"/>
-          <a:chExt cx="0" cy="0"/>
-        </a:xfrm>
-      </p:grpSpPr>
-      <p:sp>
-        <p:nvSpPr>
-          <p:cNvPr id="2" name="Title 1"/>
-          <p:cNvSpPr>
-            <a:spLocks noGrp="1"/>
-          </p:cNvSpPr>
-          <p:nvPr>
-            <p:ph type="title"/>
-          </p:nvPr>
-        </p:nvSpPr>
-        <p:spPr/>
-        <p:txBody>
-          <a:bodyPr/>
-          <a:lstStyle/>
-          <a:p>
-            <a:r>
               <a:rPr lang="en-AU" dirty="0"/>
               <a:t>Computational Concepts</a:t>
             </a:r>
@@ -7730,7 +7450,7 @@
           <a:p>
             <a:fld id="{9DA84D9E-BF3A-4773-AB62-CF0D9AB694A3}" type="slidenum">
               <a:rPr lang="en-AU" smtClean="0"/>
-              <a:t>20</a:t>
+              <a:t>19</a:t>
             </a:fld>
             <a:endParaRPr lang="en-AU"/>
           </a:p>
@@ -7782,7 +7502,7 @@
 </p:sld>
 </file>
 
-<file path=ppt/slides/slide21.xml><?xml version="1.0" encoding="utf-8"?>
+<file path=ppt/slides/slide2.xml><?xml version="1.0" encoding="utf-8"?>
 <p:sld xmlns:a="http://schemas.openxmlformats.org/drawingml/2006/main" xmlns:r="http://schemas.openxmlformats.org/officeDocument/2006/relationships" xmlns:p="http://schemas.openxmlformats.org/presentationml/2006/main">
   <p:cSld>
     <p:spTree>
@@ -7815,6 +7535,135 @@
           <a:lstStyle/>
           <a:p>
             <a:r>
+              <a:rPr lang="en-US" dirty="0">
+                <a:solidFill>
+                  <a:schemeClr val="tx1"/>
+                </a:solidFill>
+              </a:rPr>
+              <a:t>This land</a:t>
+            </a:r>
+          </a:p>
+        </p:txBody>
+      </p:sp>
+      <p:pic>
+        <p:nvPicPr>
+          <p:cNvPr id="4" name="Content Placeholder 3" descr="map-extract.png"/>
+          <p:cNvPicPr>
+            <a:picLocks noGrp="1" noChangeAspect="1"/>
+          </p:cNvPicPr>
+          <p:nvPr>
+            <p:ph idx="1"/>
+          </p:nvPr>
+        </p:nvPicPr>
+        <p:blipFill rotWithShape="1">
+          <a:blip r:embed="rId3">
+            <a:extLst>
+              <a:ext uri="{28A0092B-C50C-407E-A947-70E740481C1C}">
+                <a14:useLocalDpi xmlns:a14="http://schemas.microsoft.com/office/drawing/2010/main" val="0"/>
+              </a:ext>
+            </a:extLst>
+          </a:blip>
+          <a:stretch/>
+        </p:blipFill>
+        <p:spPr>
+          <a:xfrm>
+            <a:off x="4607655" y="4004004"/>
+            <a:ext cx="2976689" cy="2154183"/>
+          </a:xfrm>
+        </p:spPr>
+      </p:pic>
+      <p:sp>
+        <p:nvSpPr>
+          <p:cNvPr id="5" name="TextBox 4"/>
+          <p:cNvSpPr txBox="1"/>
+          <p:nvPr/>
+        </p:nvSpPr>
+        <p:spPr>
+          <a:xfrm>
+            <a:off x="1442783" y="2156067"/>
+            <a:ext cx="10072183" cy="1569660"/>
+          </a:xfrm>
+          <a:prstGeom prst="rect">
+            <a:avLst/>
+          </a:prstGeom>
+          <a:noFill/>
+        </p:spPr>
+        <p:txBody>
+          <a:bodyPr wrap="square" rtlCol="0">
+            <a:spAutoFit/>
+          </a:bodyPr>
+          <a:lstStyle/>
+          <a:p>
+            <a:pPr algn="ctr"/>
+            <a:r>
+              <a:rPr lang="en-US" sz="3200" dirty="0"/>
+              <a:t>We acknowledge and respect the </a:t>
+            </a:r>
+            <a:r>
+              <a:rPr lang="en-US" sz="3200" dirty="0" err="1"/>
+              <a:t>Pambalong</a:t>
+            </a:r>
+            <a:r>
+              <a:rPr lang="en-US" sz="3200" dirty="0"/>
+              <a:t> clan of the </a:t>
+            </a:r>
+            <a:r>
+              <a:rPr lang="en-US" sz="3200" dirty="0" err="1"/>
+              <a:t>Awabakal</a:t>
+            </a:r>
+            <a:r>
+              <a:rPr lang="en-US" sz="3200" dirty="0"/>
+              <a:t> people, traditional custodians of this land.</a:t>
+            </a:r>
+          </a:p>
+        </p:txBody>
+      </p:sp>
+    </p:spTree>
+    <p:extLst>
+      <p:ext uri="{BB962C8B-B14F-4D97-AF65-F5344CB8AC3E}">
+        <p14:creationId xmlns:p14="http://schemas.microsoft.com/office/powerpoint/2010/main" val="2442160859"/>
+      </p:ext>
+    </p:extLst>
+  </p:cSld>
+  <p:clrMapOvr>
+    <a:masterClrMapping/>
+  </p:clrMapOvr>
+</p:sld>
+</file>
+
+<file path=ppt/slides/slide20.xml><?xml version="1.0" encoding="utf-8"?>
+<p:sld xmlns:a="http://schemas.openxmlformats.org/drawingml/2006/main" xmlns:r="http://schemas.openxmlformats.org/officeDocument/2006/relationships" xmlns:p="http://schemas.openxmlformats.org/presentationml/2006/main">
+  <p:cSld>
+    <p:spTree>
+      <p:nvGrpSpPr>
+        <p:cNvPr id="1" name=""/>
+        <p:cNvGrpSpPr/>
+        <p:nvPr/>
+      </p:nvGrpSpPr>
+      <p:grpSpPr>
+        <a:xfrm>
+          <a:off x="0" y="0"/>
+          <a:ext cx="0" cy="0"/>
+          <a:chOff x="0" y="0"/>
+          <a:chExt cx="0" cy="0"/>
+        </a:xfrm>
+      </p:grpSpPr>
+      <p:sp>
+        <p:nvSpPr>
+          <p:cNvPr id="2" name="Title 1"/>
+          <p:cNvSpPr>
+            <a:spLocks noGrp="1"/>
+          </p:cNvSpPr>
+          <p:nvPr>
+            <p:ph type="title"/>
+          </p:nvPr>
+        </p:nvSpPr>
+        <p:spPr/>
+        <p:txBody>
+          <a:bodyPr/>
+          <a:lstStyle/>
+          <a:p>
+            <a:r>
               <a:rPr lang="en-AU" dirty="0"/>
               <a:t>Computational Concepts</a:t>
             </a:r>
@@ -7869,7 +7718,7 @@
           <a:p>
             <a:fld id="{9DA84D9E-BF3A-4773-AB62-CF0D9AB694A3}" type="slidenum">
               <a:rPr lang="en-AU" smtClean="0"/>
-              <a:t>21</a:t>
+              <a:t>20</a:t>
             </a:fld>
             <a:endParaRPr lang="en-AU"/>
           </a:p>
@@ -7945,7 +7794,7 @@
 </p:sld>
 </file>
 
-<file path=ppt/slides/slide22.xml><?xml version="1.0" encoding="utf-8"?>
+<file path=ppt/slides/slide21.xml><?xml version="1.0" encoding="utf-8"?>
 <p:sld xmlns:a="http://schemas.openxmlformats.org/drawingml/2006/main" xmlns:r="http://schemas.openxmlformats.org/officeDocument/2006/relationships" xmlns:p="http://schemas.openxmlformats.org/presentationml/2006/main">
   <p:cSld>
     <p:spTree>
@@ -8041,7 +7890,7 @@
           <a:p>
             <a:fld id="{9DA84D9E-BF3A-4773-AB62-CF0D9AB694A3}" type="slidenum">
               <a:rPr lang="en-AU" smtClean="0"/>
-              <a:t>22</a:t>
+              <a:t>21</a:t>
             </a:fld>
             <a:endParaRPr lang="en-AU"/>
           </a:p>
@@ -8093,7 +7942,7 @@
 </p:sld>
 </file>
 
-<file path=ppt/slides/slide23.xml><?xml version="1.0" encoding="utf-8"?>
+<file path=ppt/slides/slide22.xml><?xml version="1.0" encoding="utf-8"?>
 <p:sld xmlns:a="http://schemas.openxmlformats.org/drawingml/2006/main" xmlns:r="http://schemas.openxmlformats.org/officeDocument/2006/relationships" xmlns:p="http://schemas.openxmlformats.org/presentationml/2006/main">
   <p:cSld>
     <p:spTree>
@@ -8180,7 +8029,7 @@
           <a:p>
             <a:fld id="{9DA84D9E-BF3A-4773-AB62-CF0D9AB694A3}" type="slidenum">
               <a:rPr lang="en-AU" smtClean="0"/>
-              <a:t>23</a:t>
+              <a:t>22</a:t>
             </a:fld>
             <a:endParaRPr lang="en-AU"/>
           </a:p>
@@ -8280,7 +8129,7 @@
 </p:sld>
 </file>
 
-<file path=ppt/slides/slide24.xml><?xml version="1.0" encoding="utf-8"?>
+<file path=ppt/slides/slide23.xml><?xml version="1.0" encoding="utf-8"?>
 <p:sld xmlns:a="http://schemas.openxmlformats.org/drawingml/2006/main" xmlns:r="http://schemas.openxmlformats.org/officeDocument/2006/relationships" xmlns:p="http://schemas.openxmlformats.org/presentationml/2006/main">
   <p:cSld>
     <p:spTree>
@@ -8336,7 +8185,7 @@
           <a:p>
             <a:fld id="{9DA84D9E-BF3A-4773-AB62-CF0D9AB694A3}" type="slidenum">
               <a:rPr lang="en-AU" smtClean="0"/>
-              <a:t>24</a:t>
+              <a:t>23</a:t>
             </a:fld>
             <a:endParaRPr lang="en-AU"/>
           </a:p>
@@ -8430,7 +8279,7 @@
 </p:sld>
 </file>
 
-<file path=ppt/slides/slide25.xml><?xml version="1.0" encoding="utf-8"?>
+<file path=ppt/slides/slide24.xml><?xml version="1.0" encoding="utf-8"?>
 <p:sld xmlns:a="http://schemas.openxmlformats.org/drawingml/2006/main" xmlns:r="http://schemas.openxmlformats.org/officeDocument/2006/relationships" xmlns:p="http://schemas.openxmlformats.org/presentationml/2006/main">
   <p:cSld>
     <p:spTree>
@@ -8486,7 +8335,7 @@
           <a:p>
             <a:fld id="{9DA84D9E-BF3A-4773-AB62-CF0D9AB694A3}" type="slidenum">
               <a:rPr lang="en-AU" smtClean="0"/>
-              <a:t>25</a:t>
+              <a:t>24</a:t>
             </a:fld>
             <a:endParaRPr lang="en-AU"/>
           </a:p>
@@ -8595,7 +8444,7 @@
 </p:sld>
 </file>
 
-<file path=ppt/slides/slide26.xml><?xml version="1.0" encoding="utf-8"?>
+<file path=ppt/slides/slide25.xml><?xml version="1.0" encoding="utf-8"?>
 <p:sld xmlns:a="http://schemas.openxmlformats.org/drawingml/2006/main" xmlns:r="http://schemas.openxmlformats.org/officeDocument/2006/relationships" xmlns:p="http://schemas.openxmlformats.org/presentationml/2006/main">
   <p:cSld>
     <p:spTree>
@@ -8699,7 +8548,7 @@
           <a:p>
             <a:fld id="{9DA84D9E-BF3A-4773-AB62-CF0D9AB694A3}" type="slidenum">
               <a:rPr lang="en-AU" smtClean="0"/>
-              <a:t>26</a:t>
+              <a:t>25</a:t>
             </a:fld>
             <a:endParaRPr lang="en-AU"/>
           </a:p>
@@ -8751,7 +8600,7 @@
 </p:sld>
 </file>
 
-<file path=ppt/slides/slide27.xml><?xml version="1.0" encoding="utf-8"?>
+<file path=ppt/slides/slide26.xml><?xml version="1.0" encoding="utf-8"?>
 <p:sld xmlns:a="http://schemas.openxmlformats.org/drawingml/2006/main" xmlns:r="http://schemas.openxmlformats.org/officeDocument/2006/relationships" xmlns:p="http://schemas.openxmlformats.org/presentationml/2006/main">
   <p:cSld>
     <p:spTree>
@@ -8931,7 +8780,7 @@
           <a:p>
             <a:fld id="{9DA84D9E-BF3A-4773-AB62-CF0D9AB694A3}" type="slidenum">
               <a:rPr lang="en-AU" smtClean="0"/>
-              <a:t>27</a:t>
+              <a:t>26</a:t>
             </a:fld>
             <a:endParaRPr lang="en-AU"/>
           </a:p>
@@ -8983,7 +8832,7 @@
 </p:sld>
 </file>
 
-<file path=ppt/slides/slide28.xml><?xml version="1.0" encoding="utf-8"?>
+<file path=ppt/slides/slide27.xml><?xml version="1.0" encoding="utf-8"?>
 <p:sld xmlns:a="http://schemas.openxmlformats.org/drawingml/2006/main" xmlns:r="http://schemas.openxmlformats.org/officeDocument/2006/relationships" xmlns:p="http://schemas.openxmlformats.org/presentationml/2006/main">
   <p:cSld>
     <p:spTree>
@@ -9250,7 +9099,7 @@
           <a:p>
             <a:fld id="{9DA84D9E-BF3A-4773-AB62-CF0D9AB694A3}" type="slidenum">
               <a:rPr lang="en-AU" smtClean="0"/>
-              <a:t>28</a:t>
+              <a:t>27</a:t>
             </a:fld>
             <a:endParaRPr lang="en-AU"/>
           </a:p>

</xml_diff>